<commit_message>
fix in the presentation
</commit_message>
<xml_diff>
--- a/OS161_power_point.pptx
+++ b/OS161_power_point.pptx
@@ -244,7 +244,7 @@
             <a:pPr algn="r" rtl="0"/>
             <a:fld id="{221A1788-7372-4FAC-9AF0-00B54B8D9CBA}" type="datetime1">
               <a:rPr lang="it-IT" smtClean="0"/>
-              <a:t>07/02/2023</a:t>
+              <a:t>09/02/2023</a:t>
             </a:fld>
             <a:endParaRPr lang="it-IT" dirty="0"/>
           </a:p>
@@ -414,7 +414,7 @@
             <a:fld id="{D943A304-85CD-4257-B418-D8F889FE0DBC}" type="datetime1">
               <a:rPr lang="it-IT" smtClean="0"/>
               <a:pPr/>
-              <a:t>07/02/2023</a:t>
+              <a:t>09/02/2023</a:t>
             </a:fld>
             <a:endParaRPr lang="it-IT" dirty="0"/>
           </a:p>
@@ -2469,7 +2469,7 @@
             <a:fld id="{3889EF9B-A500-41B6-8F1C-893813E9A898}" type="datetime1">
               <a:rPr lang="it-IT" smtClean="0"/>
               <a:pPr/>
-              <a:t>07/02/2023</a:t>
+              <a:t>09/02/2023</a:t>
             </a:fld>
             <a:endParaRPr lang="it-IT" dirty="0"/>
           </a:p>
@@ -2675,7 +2675,7 @@
             <a:fld id="{6E724BBD-5BEA-4971-A6C4-42E94AF7CB5F}" type="datetime1">
               <a:rPr lang="it-IT" smtClean="0"/>
               <a:pPr/>
-              <a:t>07/02/2023</a:t>
+              <a:t>09/02/2023</a:t>
             </a:fld>
             <a:endParaRPr lang="it-IT" dirty="0"/>
           </a:p>
@@ -2891,7 +2891,7 @@
             <a:fld id="{EF1B2188-7D8C-43C8-B29F-60D01DE77B72}" type="datetime1">
               <a:rPr lang="it-IT" smtClean="0"/>
               <a:pPr/>
-              <a:t>07/02/2023</a:t>
+              <a:t>09/02/2023</a:t>
             </a:fld>
             <a:endParaRPr lang="it-IT" dirty="0"/>
           </a:p>
@@ -3097,7 +3097,7 @@
             <a:fld id="{581DC961-63CE-49AB-921E-1CE3DDEFC80A}" type="datetime1">
               <a:rPr lang="it-IT" smtClean="0"/>
               <a:pPr/>
-              <a:t>07/02/2023</a:t>
+              <a:t>09/02/2023</a:t>
             </a:fld>
             <a:endParaRPr lang="it-IT" dirty="0"/>
           </a:p>
@@ -3541,7 +3541,7 @@
             <a:fld id="{C6066F5F-3C86-4285-A86F-35EFBBDD7800}" type="datetime1">
               <a:rPr lang="it-IT" smtClean="0"/>
               <a:pPr/>
-              <a:t>07/02/2023</a:t>
+              <a:t>09/02/2023</a:t>
             </a:fld>
             <a:endParaRPr lang="it-IT" dirty="0"/>
           </a:p>
@@ -3853,7 +3853,7 @@
             <a:fld id="{0B9BE34E-14EC-4041-A597-EE22FC16794F}" type="datetime1">
               <a:rPr lang="it-IT" smtClean="0"/>
               <a:pPr/>
-              <a:t>07/02/2023</a:t>
+              <a:t>09/02/2023</a:t>
             </a:fld>
             <a:endParaRPr lang="it-IT" dirty="0"/>
           </a:p>
@@ -4317,7 +4317,7 @@
             <a:fld id="{D6FAD192-1BF7-4994-9CBA-74265F19F4C1}" type="datetime1">
               <a:rPr lang="it-IT" smtClean="0"/>
               <a:pPr/>
-              <a:t>07/02/2023</a:t>
+              <a:t>09/02/2023</a:t>
             </a:fld>
             <a:endParaRPr lang="it-IT" dirty="0"/>
           </a:p>
@@ -4455,7 +4455,7 @@
             <a:fld id="{C476DD40-7EBA-46D0-A855-62759524AC7A}" type="datetime1">
               <a:rPr lang="it-IT" smtClean="0"/>
               <a:pPr/>
-              <a:t>07/02/2023</a:t>
+              <a:t>09/02/2023</a:t>
             </a:fld>
             <a:endParaRPr lang="it-IT" dirty="0"/>
           </a:p>
@@ -4569,7 +4569,7 @@
             <a:fld id="{C62E4D95-88E1-4556-89BE-EC650C1D14A8}" type="datetime1">
               <a:rPr lang="it-IT" smtClean="0"/>
               <a:pPr/>
-              <a:t>07/02/2023</a:t>
+              <a:t>09/02/2023</a:t>
             </a:fld>
             <a:endParaRPr lang="it-IT" dirty="0"/>
           </a:p>
@@ -4876,7 +4876,7 @@
             <a:fld id="{1F9867D3-FC26-40B1-8BB9-B19FF8D6CD45}" type="datetime1">
               <a:rPr lang="it-IT" smtClean="0"/>
               <a:pPr/>
-              <a:t>07/02/2023</a:t>
+              <a:t>09/02/2023</a:t>
             </a:fld>
             <a:endParaRPr lang="it-IT" dirty="0"/>
           </a:p>
@@ -5173,7 +5173,7 @@
             <a:fld id="{5B0EE21F-92EE-4289-AFFB-9252D957F459}" type="datetime1">
               <a:rPr lang="it-IT" smtClean="0"/>
               <a:pPr/>
-              <a:t>07/02/2023</a:t>
+              <a:t>09/02/2023</a:t>
             </a:fld>
             <a:endParaRPr lang="it-IT" dirty="0"/>
           </a:p>
@@ -5797,7 +5797,7 @@
             <a:fld id="{8A756645-DD8C-4009-9A84-A4AD56EB55A9}" type="datetime1">
               <a:rPr lang="it-IT" smtClean="0"/>
               <a:pPr/>
-              <a:t>07/02/2023</a:t>
+              <a:t>09/02/2023</a:t>
             </a:fld>
             <a:endParaRPr lang="it-IT" dirty="0"/>
           </a:p>
@@ -9367,7 +9367,15 @@
             </a:r>
             <a:r>
               <a:rPr lang="it-IT" sz="1600" dirty="0"/>
-              <a:t> a file in the file system.</a:t>
+              <a:t> a file in the </a:t>
+            </a:r>
+            <a:r>
+              <a:rPr lang="it-IT" sz="1600" dirty="0" err="1"/>
+              <a:t>virtual</a:t>
+            </a:r>
+            <a:r>
+              <a:rPr lang="it-IT" sz="1600" dirty="0"/>
+              <a:t> file system.</a:t>
             </a:r>
           </a:p>
           <a:p>
@@ -10503,15 +10511,23 @@
             </a:pPr>
             <a:r>
               <a:rPr lang="it-IT" sz="1600" dirty="0"/>
-              <a:t>In case of success </a:t>
-            </a:r>
-            <a:r>
-              <a:rPr lang="it-IT" sz="1600" dirty="0" err="1"/>
-              <a:t>return</a:t>
-            </a:r>
-            <a:r>
-              <a:rPr lang="it-IT" sz="1600" dirty="0"/>
-              <a:t> the </a:t>
+              <a:t>In case of success the </a:t>
+            </a:r>
+            <a:r>
+              <a:rPr lang="it-IT" sz="1600" dirty="0" err="1"/>
+              <a:t>ret_value</a:t>
+            </a:r>
+            <a:r>
+              <a:rPr lang="it-IT" sz="1600" dirty="0"/>
+              <a:t> </a:t>
+            </a:r>
+            <a:r>
+              <a:rPr lang="it-IT" sz="1600" dirty="0" err="1"/>
+              <a:t>is</a:t>
+            </a:r>
+            <a:r>
+              <a:rPr lang="it-IT" sz="1600" dirty="0"/>
+              <a:t>  </a:t>
             </a:r>
             <a:r>
               <a:rPr lang="it-IT" sz="1600" dirty="0" err="1"/>
@@ -11092,15 +11108,7 @@
             </a:r>
             <a:r>
               <a:rPr lang="it-IT" sz="1600" dirty="0"/>
-              <a:t> 0 in case of success. -1 </a:t>
-            </a:r>
-            <a:r>
-              <a:rPr lang="it-IT" sz="1600" dirty="0" err="1"/>
-              <a:t>otherwise</a:t>
-            </a:r>
-            <a:r>
-              <a:rPr lang="it-IT" sz="1600" dirty="0"/>
-              <a:t>.</a:t>
+              <a:t> 0 in case of success. </a:t>
             </a:r>
           </a:p>
         </p:txBody>
@@ -11709,15 +11717,15 @@
             </a:r>
             <a:r>
               <a:rPr lang="it-IT" sz="1600" dirty="0" err="1"/>
-              <a:t>write</a:t>
-            </a:r>
-            <a:r>
-              <a:rPr lang="it-IT" sz="1600" dirty="0"/>
-              <a:t> system call </a:t>
-            </a:r>
-            <a:r>
-              <a:rPr lang="it-IT" sz="1600" dirty="0" err="1"/>
-              <a:t>returns</a:t>
+              <a:t>ret_val</a:t>
+            </a:r>
+            <a:r>
+              <a:rPr lang="it-IT" sz="1600" dirty="0"/>
+              <a:t> </a:t>
+            </a:r>
+            <a:r>
+              <a:rPr lang="it-IT" sz="1600" dirty="0" err="1"/>
+              <a:t>is</a:t>
             </a:r>
             <a:r>
               <a:rPr lang="it-IT" sz="1600" dirty="0"/>
@@ -11737,7 +11745,31 @@
             </a:r>
             <a:r>
               <a:rPr lang="it-IT" sz="1600" dirty="0"/>
-              <a:t> or -1 in case of </a:t>
+              <a:t> or the </a:t>
+            </a:r>
+            <a:r>
+              <a:rPr lang="it-IT" sz="1600" dirty="0" err="1"/>
+              <a:t>correct</a:t>
+            </a:r>
+            <a:r>
+              <a:rPr lang="it-IT" sz="1600" dirty="0"/>
+              <a:t> </a:t>
+            </a:r>
+            <a:r>
+              <a:rPr lang="it-IT" sz="1600" dirty="0" err="1"/>
+              <a:t>error</a:t>
+            </a:r>
+            <a:r>
+              <a:rPr lang="it-IT" sz="1600" dirty="0"/>
+              <a:t> </a:t>
+            </a:r>
+            <a:r>
+              <a:rPr lang="it-IT" sz="1600" dirty="0" err="1"/>
+              <a:t>value</a:t>
+            </a:r>
+            <a:r>
+              <a:rPr lang="it-IT" sz="1600" dirty="0"/>
+              <a:t> in case of </a:t>
             </a:r>
             <a:r>
               <a:rPr lang="it-IT" sz="1600" dirty="0" err="1"/>
@@ -12149,35 +12181,59 @@
             </a:r>
             <a:r>
               <a:rPr lang="it-IT" sz="1600" dirty="0" err="1"/>
+              <a:t>ret_val</a:t>
+            </a:r>
+            <a:r>
+              <a:rPr lang="it-IT" sz="1600" dirty="0"/>
+              <a:t> </a:t>
+            </a:r>
+            <a:r>
+              <a:rPr lang="it-IT" sz="1600" dirty="0" err="1"/>
+              <a:t>is</a:t>
+            </a:r>
+            <a:r>
+              <a:rPr lang="it-IT" sz="1600" dirty="0"/>
+              <a:t> the </a:t>
+            </a:r>
+            <a:r>
+              <a:rPr lang="it-IT" sz="1600" dirty="0" err="1"/>
+              <a:t>amount</a:t>
+            </a:r>
+            <a:r>
+              <a:rPr lang="it-IT" sz="1600" dirty="0"/>
+              <a:t> of bytes </a:t>
+            </a:r>
+            <a:r>
+              <a:rPr lang="it-IT" sz="1600" dirty="0" err="1"/>
               <a:t>read</a:t>
             </a:r>
             <a:r>
               <a:rPr lang="it-IT" sz="1600" dirty="0"/>
-              <a:t> system call </a:t>
-            </a:r>
-            <a:r>
-              <a:rPr lang="it-IT" sz="1600" dirty="0" err="1"/>
-              <a:t>returns</a:t>
-            </a:r>
-            <a:r>
-              <a:rPr lang="it-IT" sz="1600" dirty="0"/>
-              <a:t> the </a:t>
-            </a:r>
-            <a:r>
-              <a:rPr lang="it-IT" sz="1600" dirty="0" err="1"/>
-              <a:t>amount</a:t>
-            </a:r>
-            <a:r>
-              <a:rPr lang="it-IT" sz="1600" dirty="0"/>
-              <a:t> of bytes </a:t>
-            </a:r>
-            <a:r>
-              <a:rPr lang="it-IT" sz="1600" dirty="0" err="1"/>
-              <a:t>read</a:t>
-            </a:r>
-            <a:r>
-              <a:rPr lang="it-IT" sz="1600" dirty="0"/>
-              <a:t> or -1 in case of </a:t>
+              <a:t> or the </a:t>
+            </a:r>
+            <a:r>
+              <a:rPr lang="it-IT" sz="1600" dirty="0" err="1"/>
+              <a:t>correct</a:t>
+            </a:r>
+            <a:r>
+              <a:rPr lang="it-IT" sz="1600" dirty="0"/>
+              <a:t> </a:t>
+            </a:r>
+            <a:r>
+              <a:rPr lang="it-IT" sz="1600" dirty="0" err="1"/>
+              <a:t>error</a:t>
+            </a:r>
+            <a:r>
+              <a:rPr lang="it-IT" sz="1600" dirty="0"/>
+              <a:t> </a:t>
+            </a:r>
+            <a:r>
+              <a:rPr lang="it-IT" sz="1600" dirty="0" err="1"/>
+              <a:t>value</a:t>
+            </a:r>
+            <a:r>
+              <a:rPr lang="it-IT" sz="1600" dirty="0"/>
+              <a:t> in case of </a:t>
             </a:r>
             <a:r>
               <a:rPr lang="it-IT" sz="1600" dirty="0" err="1"/>
@@ -13291,32 +13347,12 @@
               </a:spcBef>
             </a:pPr>
             <a:r>
-              <a:rPr lang="it-IT" sz="1600" dirty="0" err="1"/>
-              <a:t>If</a:t>
-            </a:r>
-            <a:r>
-              <a:rPr lang="it-IT" sz="1600" dirty="0"/>
-              <a:t> the </a:t>
-            </a:r>
-            <a:r>
-              <a:rPr lang="it-IT" sz="1600" dirty="0" err="1"/>
-              <a:t>lseek</a:t>
-            </a:r>
-            <a:r>
-              <a:rPr lang="it-IT" sz="1600" dirty="0"/>
-              <a:t> system call success </a:t>
-            </a:r>
-            <a:r>
-              <a:rPr lang="it-IT" sz="1600" dirty="0" err="1"/>
-              <a:t>return</a:t>
-            </a:r>
-            <a:r>
-              <a:rPr lang="it-IT" sz="1600" dirty="0"/>
-              <a:t> the new position of pointer </a:t>
-            </a:r>
-            <a:r>
-              <a:rPr lang="it-IT" sz="1600" dirty="0" err="1"/>
-              <a:t>otherwise</a:t>
+              <a:rPr lang="it-IT" sz="1600" dirty="0"/>
+              <a:t>The </a:t>
+            </a:r>
+            <a:r>
+              <a:rPr lang="it-IT" sz="1600" dirty="0" err="1"/>
+              <a:t>ret_val</a:t>
             </a:r>
             <a:r>
               <a:rPr lang="it-IT" sz="1600" dirty="0"/>
@@ -13324,11 +13360,11 @@
             </a:r>
             <a:r>
               <a:rPr lang="it-IT" sz="1600" dirty="0" err="1"/>
-              <a:t>returns</a:t>
-            </a:r>
-            <a:r>
-              <a:rPr lang="it-IT" sz="1600" dirty="0"/>
-              <a:t> 0</a:t>
+              <a:t>is</a:t>
+            </a:r>
+            <a:r>
+              <a:rPr lang="it-IT" sz="1600" dirty="0"/>
+              <a:t> the new position of pointer.</a:t>
             </a:r>
           </a:p>
           <a:p>
@@ -13884,15 +13920,7 @@
             </a:r>
             <a:r>
               <a:rPr lang="it-IT" sz="1600" dirty="0"/>
-              <a:t> in case of success and 0 </a:t>
-            </a:r>
-            <a:r>
-              <a:rPr lang="it-IT" sz="1600" dirty="0" err="1"/>
-              <a:t>otherwise</a:t>
-            </a:r>
-            <a:r>
-              <a:rPr lang="it-IT" sz="1600" dirty="0"/>
-              <a:t>.</a:t>
+              <a:t> in case of success.</a:t>
             </a:r>
           </a:p>
           <a:p>
@@ -14681,11 +14709,11 @@
             </a:r>
             <a:r>
               <a:rPr lang="it-IT" sz="2300" dirty="0" err="1"/>
-              <a:t>err</a:t>
+              <a:t>error</a:t>
             </a:r>
             <a:r>
               <a:rPr lang="it-IT" sz="2300" dirty="0"/>
-              <a:t> in case of </a:t>
+              <a:t> code in case of </a:t>
             </a:r>
             <a:r>
               <a:rPr lang="it-IT" sz="2300" dirty="0" err="1"/>
@@ -14937,7 +14965,7 @@
         </p:spPr>
         <p:txBody>
           <a:bodyPr vert="horz" lIns="91440" tIns="45720" rIns="91440" bIns="45720" rtlCol="0">
-            <a:normAutofit/>
+            <a:normAutofit fontScale="92500"/>
           </a:bodyPr>
           <a:lstStyle>
             <a:lvl1pPr marL="228600" indent="-228600" algn="l" defTabSz="914400" rtl="0" eaLnBrk="1" latinLnBrk="0" hangingPunct="1">
@@ -15274,7 +15302,15 @@
             </a:r>
             <a:r>
               <a:rPr lang="it-IT" sz="1800" dirty="0" err="1"/>
-              <a:t>err</a:t>
+              <a:t>error</a:t>
+            </a:r>
+            <a:r>
+              <a:rPr lang="it-IT" sz="1800" dirty="0"/>
+              <a:t> </a:t>
+            </a:r>
+            <a:r>
+              <a:rPr lang="it-IT" sz="1800" dirty="0" err="1"/>
+              <a:t>value</a:t>
             </a:r>
             <a:r>
               <a:rPr lang="it-IT" sz="1800" dirty="0"/>
@@ -19116,15 +19152,6 @@
 </file>
 
 <file path=customXml/item1.xml><?xml version="1.0" encoding="utf-8"?>
-<?mso-contentType ?>
-<FormTemplates xmlns="http://schemas.microsoft.com/sharepoint/v3/contenttype/forms">
-  <Display>DocumentLibraryForm</Display>
-  <Edit>AssetEditForm</Edit>
-  <New>DocumentLibraryForm</New>
-</FormTemplates>
-</file>
-
-<file path=customXml/item2.xml><?xml version="1.0" encoding="utf-8"?>
 <p:properties xmlns:p="http://schemas.microsoft.com/office/2006/metadata/properties" xmlns:xsi="http://www.w3.org/2001/XMLSchema-instance" xmlns:pc="http://schemas.microsoft.com/office/infopath/2007/PartnerControls">
   <documentManagement>
     <LocPublishedLinkedAssetsLookup xmlns="4873beb7-5857-4685-be1f-d57550cc96cc" xsi:nil="true"/>
@@ -19258,6 +19285,15 @@
     <LocMarketGroupTiers2 xmlns="4873beb7-5857-4685-be1f-d57550cc96cc" xsi:nil="true"/>
   </documentManagement>
 </p:properties>
+</file>
+
+<file path=customXml/item2.xml><?xml version="1.0" encoding="utf-8"?>
+<?mso-contentType ?>
+<FormTemplates xmlns="http://schemas.microsoft.com/sharepoint/v3/contenttype/forms">
+  <Display>DocumentLibraryForm</Display>
+  <Edit>AssetEditForm</Edit>
+  <New>DocumentLibraryForm</New>
+</FormTemplates>
 </file>
 
 <file path=customXml/item3.xml><?xml version="1.0" encoding="utf-8"?>
@@ -20301,14 +20337,6 @@
 </file>
 
 <file path=customXml/itemProps1.xml><?xml version="1.0" encoding="utf-8"?>
-<ds:datastoreItem xmlns:ds="http://schemas.openxmlformats.org/officeDocument/2006/customXml" ds:itemID="{3836F65B-1B07-41EE-A0E8-BC6EF3855225}">
-  <ds:schemaRefs>
-    <ds:schemaRef ds:uri="http://schemas.microsoft.com/sharepoint/v3/contenttype/forms"/>
-  </ds:schemaRefs>
-</ds:datastoreItem>
-</file>
-
-<file path=customXml/itemProps2.xml><?xml version="1.0" encoding="utf-8"?>
 <ds:datastoreItem xmlns:ds="http://schemas.openxmlformats.org/officeDocument/2006/customXml" ds:itemID="{60C67BEE-D13F-4BD2-98A5-34D8A0977F68}">
   <ds:schemaRefs>
     <ds:schemaRef ds:uri="4873beb7-5857-4685-be1f-d57550cc96cc"/>
@@ -20320,6 +20348,14 @@
     <ds:schemaRef ds:uri="http://schemas.microsoft.com/office/infopath/2007/PartnerControls"/>
     <ds:schemaRef ds:uri="http://www.w3.org/XML/1998/namespace"/>
     <ds:schemaRef ds:uri="http://purl.org/dc/dcmitype/"/>
+  </ds:schemaRefs>
+</ds:datastoreItem>
+</file>
+
+<file path=customXml/itemProps2.xml><?xml version="1.0" encoding="utf-8"?>
+<ds:datastoreItem xmlns:ds="http://schemas.openxmlformats.org/officeDocument/2006/customXml" ds:itemID="{3836F65B-1B07-41EE-A0E8-BC6EF3855225}">
+  <ds:schemaRefs>
+    <ds:schemaRef ds:uri="http://schemas.microsoft.com/sharepoint/v3/contenttype/forms"/>
   </ds:schemaRefs>
 </ds:datastoreItem>
 </file>

</xml_diff>